<commit_message>
Add banner in about page; update tests
</commit_message>
<xml_diff>
--- a/docs/banner.pptx
+++ b/docs/banner.pptx
@@ -3505,7 +3505,7 @@
         <p:spPr>
           <a:xfrm>
             <a:off x="8097520" y="4918558"/>
-            <a:ext cx="375361" cy="1247352"/>
+            <a:ext cx="2438400" cy="1247352"/>
           </a:xfrm>
           <a:prstGeom prst="rect">
             <a:avLst/>
@@ -3643,7 +3643,7 @@
         <p:spPr>
           <a:xfrm>
             <a:off x="8097520" y="579957"/>
-            <a:ext cx="375361" cy="695170"/>
+            <a:ext cx="2438400" cy="695170"/>
           </a:xfrm>
           <a:prstGeom prst="rect">
             <a:avLst/>

</xml_diff>